<commit_message>
added synapse class notes
</commit_message>
<xml_diff>
--- a/Slides/Azure Synapse Analytics/IIHT-Capgemini Big Data Azure Training -SQL Data Warehouse.pptx
+++ b/Slides/Azure Synapse Analytics/IIHT-Capgemini Big Data Azure Training -SQL Data Warehouse.pptx
@@ -301,7 +301,7 @@
           <a:p>
             <a:fld id="{5B786F04-23E2-4B88-A7B4-F50FE0CA750B}" type="datetimeFigureOut">
               <a:rPr lang="en-IN" smtClean="0"/>
-              <a:t>19-12-2022</a:t>
+              <a:t>17-01-2023</a:t>
             </a:fld>
             <a:endParaRPr lang="en-IN"/>
           </a:p>
@@ -501,7 +501,7 @@
           <a:p>
             <a:fld id="{5B786F04-23E2-4B88-A7B4-F50FE0CA750B}" type="datetimeFigureOut">
               <a:rPr lang="en-IN" smtClean="0"/>
-              <a:t>19-12-2022</a:t>
+              <a:t>17-01-2023</a:t>
             </a:fld>
             <a:endParaRPr lang="en-IN"/>
           </a:p>
@@ -711,7 +711,7 @@
           <a:p>
             <a:fld id="{5B786F04-23E2-4B88-A7B4-F50FE0CA750B}" type="datetimeFigureOut">
               <a:rPr lang="en-IN" smtClean="0"/>
-              <a:t>19-12-2022</a:t>
+              <a:t>17-01-2023</a:t>
             </a:fld>
             <a:endParaRPr lang="en-IN"/>
           </a:p>
@@ -911,7 +911,7 @@
           <a:p>
             <a:fld id="{5B786F04-23E2-4B88-A7B4-F50FE0CA750B}" type="datetimeFigureOut">
               <a:rPr lang="en-IN" smtClean="0"/>
-              <a:t>19-12-2022</a:t>
+              <a:t>17-01-2023</a:t>
             </a:fld>
             <a:endParaRPr lang="en-IN"/>
           </a:p>
@@ -1187,7 +1187,7 @@
           <a:p>
             <a:fld id="{5B786F04-23E2-4B88-A7B4-F50FE0CA750B}" type="datetimeFigureOut">
               <a:rPr lang="en-IN" smtClean="0"/>
-              <a:t>19-12-2022</a:t>
+              <a:t>17-01-2023</a:t>
             </a:fld>
             <a:endParaRPr lang="en-IN"/>
           </a:p>
@@ -1455,7 +1455,7 @@
           <a:p>
             <a:fld id="{5B786F04-23E2-4B88-A7B4-F50FE0CA750B}" type="datetimeFigureOut">
               <a:rPr lang="en-IN" smtClean="0"/>
-              <a:t>19-12-2022</a:t>
+              <a:t>17-01-2023</a:t>
             </a:fld>
             <a:endParaRPr lang="en-IN"/>
           </a:p>
@@ -1870,7 +1870,7 @@
           <a:p>
             <a:fld id="{5B786F04-23E2-4B88-A7B4-F50FE0CA750B}" type="datetimeFigureOut">
               <a:rPr lang="en-IN" smtClean="0"/>
-              <a:t>19-12-2022</a:t>
+              <a:t>17-01-2023</a:t>
             </a:fld>
             <a:endParaRPr lang="en-IN"/>
           </a:p>
@@ -2012,7 +2012,7 @@
           <a:p>
             <a:fld id="{5B786F04-23E2-4B88-A7B4-F50FE0CA750B}" type="datetimeFigureOut">
               <a:rPr lang="en-IN" smtClean="0"/>
-              <a:t>19-12-2022</a:t>
+              <a:t>17-01-2023</a:t>
             </a:fld>
             <a:endParaRPr lang="en-IN"/>
           </a:p>
@@ -2125,7 +2125,7 @@
           <a:p>
             <a:fld id="{5B786F04-23E2-4B88-A7B4-F50FE0CA750B}" type="datetimeFigureOut">
               <a:rPr lang="en-IN" smtClean="0"/>
-              <a:t>19-12-2022</a:t>
+              <a:t>17-01-2023</a:t>
             </a:fld>
             <a:endParaRPr lang="en-IN"/>
           </a:p>
@@ -2438,7 +2438,7 @@
           <a:p>
             <a:fld id="{5B786F04-23E2-4B88-A7B4-F50FE0CA750B}" type="datetimeFigureOut">
               <a:rPr lang="en-IN" smtClean="0"/>
-              <a:t>19-12-2022</a:t>
+              <a:t>17-01-2023</a:t>
             </a:fld>
             <a:endParaRPr lang="en-IN"/>
           </a:p>
@@ -2727,7 +2727,7 @@
           <a:p>
             <a:fld id="{5B786F04-23E2-4B88-A7B4-F50FE0CA750B}" type="datetimeFigureOut">
               <a:rPr lang="en-IN" smtClean="0"/>
-              <a:t>19-12-2022</a:t>
+              <a:t>17-01-2023</a:t>
             </a:fld>
             <a:endParaRPr lang="en-IN"/>
           </a:p>
@@ -2970,7 +2970,7 @@
           <a:p>
             <a:fld id="{5B786F04-23E2-4B88-A7B4-F50FE0CA750B}" type="datetimeFigureOut">
               <a:rPr lang="en-IN" smtClean="0"/>
-              <a:t>19-12-2022</a:t>
+              <a:t>17-01-2023</a:t>
             </a:fld>
             <a:endParaRPr lang="en-IN"/>
           </a:p>

</xml_diff>